<commit_message>
added C(1-C) stuff, about to Tang2014
</commit_message>
<xml_diff>
--- a/1801_FSE_pics.pptx
+++ b/1801_FSE_pics.pptx
@@ -9,7 +9,7 @@
     <p:sldId id="258" r:id="rId3"/>
   </p:sldIdLst>
   <p:sldSz cx="9144000" cy="6858000" type="screen4x3"/>
-  <p:notesSz cx="6858000" cy="9144000"/>
+  <p:notesSz cx="6797675" cy="9926638"/>
   <p:defaultTextStyle>
     <a:defPPr>
       <a:defRPr lang="en-US"/>
@@ -305,7 +305,7 @@
           <a:p>
             <a:fld id="{0460A97C-6094-44F3-9AD2-0A11796E8BE7}" type="datetimeFigureOut">
               <a:rPr lang="en-US" smtClean="0"/>
-              <a:t>1/31/2019</a:t>
+              <a:t>2/7/2019</a:t>
             </a:fld>
             <a:endParaRPr lang="en-GB"/>
           </a:p>
@@ -470,7 +470,7 @@
           <a:p>
             <a:fld id="{0460A97C-6094-44F3-9AD2-0A11796E8BE7}" type="datetimeFigureOut">
               <a:rPr lang="en-US" smtClean="0"/>
-              <a:t>1/31/2019</a:t>
+              <a:t>2/7/2019</a:t>
             </a:fld>
             <a:endParaRPr lang="en-GB"/>
           </a:p>
@@ -645,7 +645,7 @@
           <a:p>
             <a:fld id="{0460A97C-6094-44F3-9AD2-0A11796E8BE7}" type="datetimeFigureOut">
               <a:rPr lang="en-US" smtClean="0"/>
-              <a:t>1/31/2019</a:t>
+              <a:t>2/7/2019</a:t>
             </a:fld>
             <a:endParaRPr lang="en-GB"/>
           </a:p>
@@ -810,7 +810,7 @@
           <a:p>
             <a:fld id="{0460A97C-6094-44F3-9AD2-0A11796E8BE7}" type="datetimeFigureOut">
               <a:rPr lang="en-US" smtClean="0"/>
-              <a:t>1/31/2019</a:t>
+              <a:t>2/7/2019</a:t>
             </a:fld>
             <a:endParaRPr lang="en-GB"/>
           </a:p>
@@ -1051,7 +1051,7 @@
           <a:p>
             <a:fld id="{0460A97C-6094-44F3-9AD2-0A11796E8BE7}" type="datetimeFigureOut">
               <a:rPr lang="en-US" smtClean="0"/>
-              <a:t>1/31/2019</a:t>
+              <a:t>2/7/2019</a:t>
             </a:fld>
             <a:endParaRPr lang="en-GB"/>
           </a:p>
@@ -1334,7 +1334,7 @@
           <a:p>
             <a:fld id="{0460A97C-6094-44F3-9AD2-0A11796E8BE7}" type="datetimeFigureOut">
               <a:rPr lang="en-US" smtClean="0"/>
-              <a:t>1/31/2019</a:t>
+              <a:t>2/7/2019</a:t>
             </a:fld>
             <a:endParaRPr lang="en-GB"/>
           </a:p>
@@ -1751,7 +1751,7 @@
           <a:p>
             <a:fld id="{0460A97C-6094-44F3-9AD2-0A11796E8BE7}" type="datetimeFigureOut">
               <a:rPr lang="en-US" smtClean="0"/>
-              <a:t>1/31/2019</a:t>
+              <a:t>2/7/2019</a:t>
             </a:fld>
             <a:endParaRPr lang="en-GB"/>
           </a:p>
@@ -1864,7 +1864,7 @@
           <a:p>
             <a:fld id="{0460A97C-6094-44F3-9AD2-0A11796E8BE7}" type="datetimeFigureOut">
               <a:rPr lang="en-US" smtClean="0"/>
-              <a:t>1/31/2019</a:t>
+              <a:t>2/7/2019</a:t>
             </a:fld>
             <a:endParaRPr lang="en-GB"/>
           </a:p>
@@ -1954,7 +1954,7 @@
           <a:p>
             <a:fld id="{0460A97C-6094-44F3-9AD2-0A11796E8BE7}" type="datetimeFigureOut">
               <a:rPr lang="en-US" smtClean="0"/>
-              <a:t>1/31/2019</a:t>
+              <a:t>2/7/2019</a:t>
             </a:fld>
             <a:endParaRPr lang="en-GB"/>
           </a:p>
@@ -2226,7 +2226,7 @@
           <a:p>
             <a:fld id="{0460A97C-6094-44F3-9AD2-0A11796E8BE7}" type="datetimeFigureOut">
               <a:rPr lang="en-US" smtClean="0"/>
-              <a:t>1/31/2019</a:t>
+              <a:t>2/7/2019</a:t>
             </a:fld>
             <a:endParaRPr lang="en-GB"/>
           </a:p>
@@ -2478,7 +2478,7 @@
           <a:p>
             <a:fld id="{0460A97C-6094-44F3-9AD2-0A11796E8BE7}" type="datetimeFigureOut">
               <a:rPr lang="en-US" smtClean="0"/>
-              <a:t>1/31/2019</a:t>
+              <a:t>2/7/2019</a:t>
             </a:fld>
             <a:endParaRPr lang="en-GB"/>
           </a:p>
@@ -2686,7 +2686,7 @@
           <a:p>
             <a:fld id="{0460A97C-6094-44F3-9AD2-0A11796E8BE7}" type="datetimeFigureOut">
               <a:rPr lang="en-US" smtClean="0"/>
-              <a:t>1/31/2019</a:t>
+              <a:t>2/7/2019</a:t>
             </a:fld>
             <a:endParaRPr lang="en-GB"/>
           </a:p>
@@ -3188,7 +3188,7 @@
       </p:sp>
       <p:pic>
         <p:nvPicPr>
-          <p:cNvPr id="4" name="Picture 3"/>
+          <p:cNvPr id="5" name="Picture 4"/>
           <p:cNvPicPr>
             <a:picLocks noChangeAspect="1"/>
           </p:cNvPicPr>
@@ -3202,8 +3202,8 @@
         </p:blipFill>
         <p:spPr>
           <a:xfrm>
-            <a:off x="0" y="0"/>
-            <a:ext cx="9036496" cy="6880844"/>
+            <a:off x="0" y="-1"/>
+            <a:ext cx="8964488" cy="6826013"/>
           </a:xfrm>
           <a:prstGeom prst="rect">
             <a:avLst/>

</xml_diff>